<commit_message>
Comment for data added
</commit_message>
<xml_diff>
--- a/Project_Idea (2).pptx
+++ b/Project_Idea (2).pptx
@@ -113,6 +113,59 @@
 </p:presentation>
 </file>
 
+<file path=ppt/revisionInfo.xml><?xml version="1.0" encoding="utf-8"?>
+<p1510:revInfo xmlns:a="http://schemas.openxmlformats.org/drawingml/2006/main" xmlns:r="http://schemas.openxmlformats.org/officeDocument/2006/relationships" xmlns:p1510="http://schemas.microsoft.com/office/powerpoint/2015/10/main">
+  <p1510:revLst>
+    <p1510:client id="{FFA8188F-B942-4A08-96FC-3BE27C79695F}" v="1" dt="2025-04-30T20:05:32.350"/>
+  </p1510:revLst>
+</p1510:revInfo>
+</file>
+
+<file path=ppt/changesInfos/changesInfo1.xml><?xml version="1.0" encoding="utf-8"?>
+<pc:chgInfo xmlns:a="http://schemas.openxmlformats.org/drawingml/2006/main" xmlns:r="http://schemas.openxmlformats.org/officeDocument/2006/relationships" xmlns:ac="http://schemas.microsoft.com/office/drawing/2013/main/command" xmlns:pc="http://schemas.microsoft.com/office/powerpoint/2013/main/command">
+  <pc:docChgLst>
+    <pc:chgData name="Kristian Bitsch Ebbensgaard" userId="db474494-81e8-4465-9809-a1d335558f45" providerId="ADAL" clId="{FFA8188F-B942-4A08-96FC-3BE27C79695F}"/>
+    <pc:docChg chg="undo custSel modSld">
+      <pc:chgData name="Kristian Bitsch Ebbensgaard" userId="db474494-81e8-4465-9809-a1d335558f45" providerId="ADAL" clId="{FFA8188F-B942-4A08-96FC-3BE27C79695F}" dt="2025-04-30T20:06:46.082" v="393" actId="20577"/>
+      <pc:docMkLst>
+        <pc:docMk/>
+      </pc:docMkLst>
+      <pc:sldChg chg="addSp delSp modSp mod">
+        <pc:chgData name="Kristian Bitsch Ebbensgaard" userId="db474494-81e8-4465-9809-a1d335558f45" providerId="ADAL" clId="{FFA8188F-B942-4A08-96FC-3BE27C79695F}" dt="2025-04-30T20:06:46.082" v="393" actId="20577"/>
+        <pc:sldMkLst>
+          <pc:docMk/>
+          <pc:sldMk cId="931196468" sldId="258"/>
+        </pc:sldMkLst>
+        <pc:spChg chg="del mod">
+          <ac:chgData name="Kristian Bitsch Ebbensgaard" userId="db474494-81e8-4465-9809-a1d335558f45" providerId="ADAL" clId="{FFA8188F-B942-4A08-96FC-3BE27C79695F}" dt="2025-04-30T20:06:03.115" v="387" actId="478"/>
+          <ac:spMkLst>
+            <pc:docMk/>
+            <pc:sldMk cId="931196468" sldId="258"/>
+            <ac:spMk id="2" creationId="{F7061AFE-E820-AA5D-0F23-1CF496725270}"/>
+          </ac:spMkLst>
+        </pc:spChg>
+        <pc:spChg chg="mod">
+          <ac:chgData name="Kristian Bitsch Ebbensgaard" userId="db474494-81e8-4465-9809-a1d335558f45" providerId="ADAL" clId="{FFA8188F-B942-4A08-96FC-3BE27C79695F}" dt="2025-04-30T20:06:46.082" v="393" actId="20577"/>
+          <ac:spMkLst>
+            <pc:docMk/>
+            <pc:sldMk cId="931196468" sldId="258"/>
+            <ac:spMk id="3" creationId="{4A3AEE3A-331D-C212-349B-045DA5F30A4E}"/>
+          </ac:spMkLst>
+        </pc:spChg>
+        <pc:spChg chg="add del mod">
+          <ac:chgData name="Kristian Bitsch Ebbensgaard" userId="db474494-81e8-4465-9809-a1d335558f45" providerId="ADAL" clId="{FFA8188F-B942-4A08-96FC-3BE27C79695F}" dt="2025-04-30T20:05:59.300" v="386" actId="478"/>
+          <ac:spMkLst>
+            <pc:docMk/>
+            <pc:sldMk cId="931196468" sldId="258"/>
+            <ac:spMk id="4" creationId="{BC286FA5-DA82-77FC-B876-8CCB805CBB65}"/>
+          </ac:spMkLst>
+        </pc:spChg>
+      </pc:sldChg>
+    </pc:docChg>
+  </pc:docChgLst>
+</pc:chgInfo>
+</file>
+
 <file path=ppt/slideLayouts/slideLayout1.xml><?xml version="1.0" encoding="utf-8"?>
 <p:sldLayout xmlns:a="http://schemas.openxmlformats.org/drawingml/2006/main" xmlns:r="http://schemas.openxmlformats.org/officeDocument/2006/relationships" xmlns:p="http://schemas.openxmlformats.org/presentationml/2006/main" type="title" preserve="1">
   <p:cSld name="Title Slide">
@@ -262,7 +315,7 @@
           <a:p>
             <a:fld id="{F309DC6E-A2C7-499C-AE0C-185FA2954680}" type="datetimeFigureOut">
               <a:rPr lang="en-DK" smtClean="0"/>
-              <a:t>04/30/2025</a:t>
+              <a:t>30/04/2025</a:t>
             </a:fld>
             <a:endParaRPr lang="en-DK"/>
           </a:p>
@@ -316,7 +369,7 @@
           <a:p>
             <a:fld id="{4BA01964-6820-4D62-A364-EA1AB704F6EC}" type="slidenum">
               <a:rPr lang="en-DK" smtClean="0"/>
-              <a:t>‹nr.›</a:t>
+              <a:t>‹#›</a:t>
             </a:fld>
             <a:endParaRPr lang="en-DK"/>
           </a:p>
@@ -462,7 +515,7 @@
           <a:p>
             <a:fld id="{F309DC6E-A2C7-499C-AE0C-185FA2954680}" type="datetimeFigureOut">
               <a:rPr lang="en-DK" smtClean="0"/>
-              <a:t>04/30/2025</a:t>
+              <a:t>30/04/2025</a:t>
             </a:fld>
             <a:endParaRPr lang="en-DK"/>
           </a:p>
@@ -516,7 +569,7 @@
           <a:p>
             <a:fld id="{4BA01964-6820-4D62-A364-EA1AB704F6EC}" type="slidenum">
               <a:rPr lang="en-DK" smtClean="0"/>
-              <a:t>‹nr.›</a:t>
+              <a:t>‹#›</a:t>
             </a:fld>
             <a:endParaRPr lang="en-DK"/>
           </a:p>
@@ -672,7 +725,7 @@
           <a:p>
             <a:fld id="{F309DC6E-A2C7-499C-AE0C-185FA2954680}" type="datetimeFigureOut">
               <a:rPr lang="en-DK" smtClean="0"/>
-              <a:t>04/30/2025</a:t>
+              <a:t>30/04/2025</a:t>
             </a:fld>
             <a:endParaRPr lang="en-DK"/>
           </a:p>
@@ -726,7 +779,7 @@
           <a:p>
             <a:fld id="{4BA01964-6820-4D62-A364-EA1AB704F6EC}" type="slidenum">
               <a:rPr lang="en-DK" smtClean="0"/>
-              <a:t>‹nr.›</a:t>
+              <a:t>‹#›</a:t>
             </a:fld>
             <a:endParaRPr lang="en-DK"/>
           </a:p>
@@ -872,7 +925,7 @@
           <a:p>
             <a:fld id="{F309DC6E-A2C7-499C-AE0C-185FA2954680}" type="datetimeFigureOut">
               <a:rPr lang="en-DK" smtClean="0"/>
-              <a:t>04/30/2025</a:t>
+              <a:t>30/04/2025</a:t>
             </a:fld>
             <a:endParaRPr lang="en-DK"/>
           </a:p>
@@ -926,7 +979,7 @@
           <a:p>
             <a:fld id="{4BA01964-6820-4D62-A364-EA1AB704F6EC}" type="slidenum">
               <a:rPr lang="en-DK" smtClean="0"/>
-              <a:t>‹nr.›</a:t>
+              <a:t>‹#›</a:t>
             </a:fld>
             <a:endParaRPr lang="en-DK"/>
           </a:p>
@@ -1148,7 +1201,7 @@
           <a:p>
             <a:fld id="{F309DC6E-A2C7-499C-AE0C-185FA2954680}" type="datetimeFigureOut">
               <a:rPr lang="en-DK" smtClean="0"/>
-              <a:t>04/30/2025</a:t>
+              <a:t>30/04/2025</a:t>
             </a:fld>
             <a:endParaRPr lang="en-DK"/>
           </a:p>
@@ -1202,7 +1255,7 @@
           <a:p>
             <a:fld id="{4BA01964-6820-4D62-A364-EA1AB704F6EC}" type="slidenum">
               <a:rPr lang="en-DK" smtClean="0"/>
-              <a:t>‹nr.›</a:t>
+              <a:t>‹#›</a:t>
             </a:fld>
             <a:endParaRPr lang="en-DK"/>
           </a:p>
@@ -1416,7 +1469,7 @@
           <a:p>
             <a:fld id="{F309DC6E-A2C7-499C-AE0C-185FA2954680}" type="datetimeFigureOut">
               <a:rPr lang="en-DK" smtClean="0"/>
-              <a:t>04/30/2025</a:t>
+              <a:t>30/04/2025</a:t>
             </a:fld>
             <a:endParaRPr lang="en-DK"/>
           </a:p>
@@ -1470,7 +1523,7 @@
           <a:p>
             <a:fld id="{4BA01964-6820-4D62-A364-EA1AB704F6EC}" type="slidenum">
               <a:rPr lang="en-DK" smtClean="0"/>
-              <a:t>‹nr.›</a:t>
+              <a:t>‹#›</a:t>
             </a:fld>
             <a:endParaRPr lang="en-DK"/>
           </a:p>
@@ -1831,7 +1884,7 @@
           <a:p>
             <a:fld id="{F309DC6E-A2C7-499C-AE0C-185FA2954680}" type="datetimeFigureOut">
               <a:rPr lang="en-DK" smtClean="0"/>
-              <a:t>04/30/2025</a:t>
+              <a:t>30/04/2025</a:t>
             </a:fld>
             <a:endParaRPr lang="en-DK"/>
           </a:p>
@@ -1885,7 +1938,7 @@
           <a:p>
             <a:fld id="{4BA01964-6820-4D62-A364-EA1AB704F6EC}" type="slidenum">
               <a:rPr lang="en-DK" smtClean="0"/>
-              <a:t>‹nr.›</a:t>
+              <a:t>‹#›</a:t>
             </a:fld>
             <a:endParaRPr lang="en-DK"/>
           </a:p>
@@ -1973,7 +2026,7 @@
           <a:p>
             <a:fld id="{F309DC6E-A2C7-499C-AE0C-185FA2954680}" type="datetimeFigureOut">
               <a:rPr lang="en-DK" smtClean="0"/>
-              <a:t>04/30/2025</a:t>
+              <a:t>30/04/2025</a:t>
             </a:fld>
             <a:endParaRPr lang="en-DK"/>
           </a:p>
@@ -2027,7 +2080,7 @@
           <a:p>
             <a:fld id="{4BA01964-6820-4D62-A364-EA1AB704F6EC}" type="slidenum">
               <a:rPr lang="en-DK" smtClean="0"/>
-              <a:t>‹nr.›</a:t>
+              <a:t>‹#›</a:t>
             </a:fld>
             <a:endParaRPr lang="en-DK"/>
           </a:p>
@@ -2086,7 +2139,7 @@
           <a:p>
             <a:fld id="{F309DC6E-A2C7-499C-AE0C-185FA2954680}" type="datetimeFigureOut">
               <a:rPr lang="en-DK" smtClean="0"/>
-              <a:t>04/30/2025</a:t>
+              <a:t>30/04/2025</a:t>
             </a:fld>
             <a:endParaRPr lang="en-DK"/>
           </a:p>
@@ -2140,7 +2193,7 @@
           <a:p>
             <a:fld id="{4BA01964-6820-4D62-A364-EA1AB704F6EC}" type="slidenum">
               <a:rPr lang="en-DK" smtClean="0"/>
-              <a:t>‹nr.›</a:t>
+              <a:t>‹#›</a:t>
             </a:fld>
             <a:endParaRPr lang="en-DK"/>
           </a:p>
@@ -2399,7 +2452,7 @@
           <a:p>
             <a:fld id="{F309DC6E-A2C7-499C-AE0C-185FA2954680}" type="datetimeFigureOut">
               <a:rPr lang="en-DK" smtClean="0"/>
-              <a:t>04/30/2025</a:t>
+              <a:t>30/04/2025</a:t>
             </a:fld>
             <a:endParaRPr lang="en-DK"/>
           </a:p>
@@ -2453,7 +2506,7 @@
           <a:p>
             <a:fld id="{4BA01964-6820-4D62-A364-EA1AB704F6EC}" type="slidenum">
               <a:rPr lang="en-DK" smtClean="0"/>
-              <a:t>‹nr.›</a:t>
+              <a:t>‹#›</a:t>
             </a:fld>
             <a:endParaRPr lang="en-DK"/>
           </a:p>
@@ -2688,7 +2741,7 @@
           <a:p>
             <a:fld id="{F309DC6E-A2C7-499C-AE0C-185FA2954680}" type="datetimeFigureOut">
               <a:rPr lang="en-DK" smtClean="0"/>
-              <a:t>04/30/2025</a:t>
+              <a:t>30/04/2025</a:t>
             </a:fld>
             <a:endParaRPr lang="en-DK"/>
           </a:p>
@@ -2742,7 +2795,7 @@
           <a:p>
             <a:fld id="{4BA01964-6820-4D62-A364-EA1AB704F6EC}" type="slidenum">
               <a:rPr lang="en-DK" smtClean="0"/>
-              <a:t>‹nr.›</a:t>
+              <a:t>‹#›</a:t>
             </a:fld>
             <a:endParaRPr lang="en-DK"/>
           </a:p>
@@ -2931,7 +2984,7 @@
           <a:p>
             <a:fld id="{F309DC6E-A2C7-499C-AE0C-185FA2954680}" type="datetimeFigureOut">
               <a:rPr lang="en-DK" smtClean="0"/>
-              <a:t>04/30/2025</a:t>
+              <a:t>30/04/2025</a:t>
             </a:fld>
             <a:endParaRPr lang="en-DK"/>
           </a:p>
@@ -3021,7 +3074,7 @@
           <a:p>
             <a:fld id="{4BA01964-6820-4D62-A364-EA1AB704F6EC}" type="slidenum">
               <a:rPr lang="en-DK" smtClean="0"/>
-              <a:t>‹nr.›</a:t>
+              <a:t>‹#›</a:t>
             </a:fld>
             <a:endParaRPr lang="en-DK"/>
           </a:p>
@@ -3350,47 +3403,6 @@
       </p:grpSpPr>
       <p:sp>
         <p:nvSpPr>
-          <p:cNvPr id="2" name="Titel 1">
-            <a:extLst>
-              <a:ext uri="{FF2B5EF4-FFF2-40B4-BE49-F238E27FC236}">
-                <a16:creationId xmlns:a16="http://schemas.microsoft.com/office/drawing/2014/main" id="{F7061AFE-E820-AA5D-0F23-1CF496725270}"/>
-              </a:ext>
-            </a:extLst>
-          </p:cNvPr>
-          <p:cNvSpPr>
-            <a:spLocks noGrp="1"/>
-          </p:cNvSpPr>
-          <p:nvPr>
-            <p:ph type="title"/>
-          </p:nvPr>
-        </p:nvSpPr>
-        <p:spPr/>
-        <p:txBody>
-          <a:bodyPr/>
-          <a:lstStyle/>
-          <a:p>
-            <a:r>
-              <a:rPr lang="da-DK" dirty="0"/>
-              <a:t>Project </a:t>
-            </a:r>
-            <a:r>
-              <a:rPr lang="da-DK" dirty="0" err="1"/>
-              <a:t>idea</a:t>
-            </a:r>
-            <a:r>
-              <a:rPr lang="da-DK" dirty="0"/>
-              <a:t> </a:t>
-            </a:r>
-            <a:r>
-              <a:rPr lang="da-DK" dirty="0" err="1"/>
-              <a:t>presentation</a:t>
-            </a:r>
-            <a:endParaRPr lang="da-DK" dirty="0"/>
-          </a:p>
-        </p:txBody>
-      </p:sp>
-      <p:sp>
-        <p:nvSpPr>
           <p:cNvPr id="3" name="Pladsholder til indhold 2">
             <a:extLst>
               <a:ext uri="{FF2B5EF4-FFF2-40B4-BE49-F238E27FC236}">
@@ -3405,308 +3417,475 @@
             <p:ph idx="1"/>
           </p:nvPr>
         </p:nvSpPr>
-        <p:spPr/>
+        <p:spPr>
+          <a:xfrm>
+            <a:off x="838200" y="1629682"/>
+            <a:ext cx="10515600" cy="4351338"/>
+          </a:xfrm>
+        </p:spPr>
         <p:txBody>
-          <a:bodyPr/>
+          <a:bodyPr>
+            <a:normAutofit/>
+          </a:bodyPr>
           <a:lstStyle/>
           <a:p>
             <a:r>
-              <a:rPr lang="da-DK" dirty="0" err="1"/>
+              <a:rPr lang="da-DK" sz="1800" dirty="0" err="1"/>
               <a:t>Our</a:t>
             </a:r>
             <a:r>
-              <a:rPr lang="da-DK" dirty="0"/>
+              <a:rPr lang="da-DK" sz="1800" dirty="0"/>
               <a:t> </a:t>
             </a:r>
             <a:r>
-              <a:rPr lang="da-DK" dirty="0" err="1"/>
+              <a:rPr lang="da-DK" sz="1800" dirty="0" err="1"/>
               <a:t>idea</a:t>
             </a:r>
             <a:r>
-              <a:rPr lang="da-DK" dirty="0"/>
+              <a:rPr lang="da-DK" sz="1800" dirty="0"/>
               <a:t> is to </a:t>
             </a:r>
             <a:r>
-              <a:rPr lang="da-DK" dirty="0" err="1"/>
+              <a:rPr lang="da-DK" sz="1800" dirty="0" err="1"/>
               <a:t>create</a:t>
             </a:r>
             <a:r>
-              <a:rPr lang="da-DK" dirty="0"/>
+              <a:rPr lang="da-DK" sz="1800" dirty="0"/>
               <a:t> a website </a:t>
             </a:r>
             <a:r>
-              <a:rPr lang="da-DK" dirty="0" err="1"/>
+              <a:rPr lang="da-DK" sz="1800" dirty="0" err="1"/>
               <a:t>where</a:t>
             </a:r>
             <a:r>
-              <a:rPr lang="da-DK" dirty="0"/>
+              <a:rPr lang="da-DK" sz="1800" dirty="0"/>
               <a:t> </a:t>
             </a:r>
             <a:r>
-              <a:rPr lang="da-DK" dirty="0" err="1"/>
+              <a:rPr lang="da-DK" sz="1800" dirty="0" err="1"/>
               <a:t>you</a:t>
             </a:r>
             <a:r>
-              <a:rPr lang="da-DK" dirty="0"/>
+              <a:rPr lang="da-DK" sz="1800" dirty="0"/>
               <a:t> </a:t>
             </a:r>
             <a:r>
-              <a:rPr lang="da-DK" dirty="0" err="1"/>
+              <a:rPr lang="da-DK" sz="1800" dirty="0" err="1"/>
               <a:t>can</a:t>
             </a:r>
             <a:r>
-              <a:rPr lang="da-DK" dirty="0"/>
+              <a:rPr lang="da-DK" sz="1800" dirty="0"/>
               <a:t> </a:t>
             </a:r>
             <a:r>
-              <a:rPr lang="da-DK" dirty="0" err="1"/>
+              <a:rPr lang="da-DK" sz="1800" dirty="0" err="1"/>
               <a:t>get</a:t>
             </a:r>
             <a:r>
-              <a:rPr lang="da-DK" dirty="0"/>
+              <a:rPr lang="da-DK" sz="1800" dirty="0"/>
               <a:t> an overview of </a:t>
             </a:r>
             <a:r>
-              <a:rPr lang="da-DK" dirty="0" err="1"/>
+              <a:rPr lang="da-DK" sz="1800" dirty="0" err="1"/>
               <a:t>how</a:t>
             </a:r>
             <a:r>
-              <a:rPr lang="da-DK" dirty="0"/>
+              <a:rPr lang="da-DK" sz="1800" dirty="0"/>
+              <a:t> Danish </a:t>
+            </a:r>
+            <a:r>
+              <a:rPr lang="da-DK" sz="1800" dirty="0" err="1"/>
+              <a:t>political</a:t>
+            </a:r>
+            <a:r>
+              <a:rPr lang="da-DK" sz="1800" dirty="0"/>
+              <a:t> parties have </a:t>
+            </a:r>
+            <a:r>
+              <a:rPr lang="da-DK" sz="1800" dirty="0" err="1"/>
+              <a:t>voted</a:t>
+            </a:r>
+            <a:r>
+              <a:rPr lang="da-DK" sz="1800" dirty="0"/>
+              <a:t> in the </a:t>
+            </a:r>
+            <a:r>
+              <a:rPr lang="da-DK" sz="1800" dirty="0" err="1"/>
+              <a:t>past</a:t>
+            </a:r>
+            <a:r>
+              <a:rPr lang="da-DK" sz="1800" dirty="0"/>
+              <a:t>. </a:t>
+            </a:r>
+          </a:p>
+          <a:p>
+            <a:r>
+              <a:rPr lang="da-DK" sz="1800" dirty="0"/>
+              <a:t>In </a:t>
+            </a:r>
+            <a:r>
+              <a:rPr lang="da-DK" sz="1800" dirty="0" err="1"/>
+              <a:t>our</a:t>
+            </a:r>
+            <a:r>
+              <a:rPr lang="da-DK" sz="1800" dirty="0"/>
+              <a:t> web </a:t>
+            </a:r>
+            <a:r>
+              <a:rPr lang="da-DK" sz="1800" dirty="0" err="1"/>
+              <a:t>application</a:t>
+            </a:r>
+            <a:r>
+              <a:rPr lang="da-DK" sz="1800" dirty="0"/>
+              <a:t> it </a:t>
+            </a:r>
+            <a:r>
+              <a:rPr lang="da-DK" sz="1800" dirty="0" err="1"/>
+              <a:t>will</a:t>
+            </a:r>
+            <a:r>
+              <a:rPr lang="da-DK" sz="1800" dirty="0"/>
               <a:t> </a:t>
             </a:r>
             <a:r>
-              <a:rPr lang="da-DK" dirty="0" err="1"/>
-              <a:t>danish</a:t>
-            </a:r>
-            <a:r>
-              <a:rPr lang="da-DK" dirty="0"/>
+              <a:rPr lang="da-DK" sz="1800" dirty="0" err="1"/>
+              <a:t>be</a:t>
+            </a:r>
+            <a:r>
+              <a:rPr lang="da-DK" sz="1800" dirty="0"/>
               <a:t> </a:t>
             </a:r>
             <a:r>
-              <a:rPr lang="da-DK" dirty="0" err="1"/>
-              <a:t>political</a:t>
-            </a:r>
-            <a:r>
-              <a:rPr lang="da-DK" dirty="0"/>
-              <a:t> parties have </a:t>
-            </a:r>
-            <a:r>
-              <a:rPr lang="da-DK" dirty="0" err="1"/>
+              <a:rPr lang="da-DK" sz="1800" dirty="0" err="1"/>
+              <a:t>possible</a:t>
+            </a:r>
+            <a:r>
+              <a:rPr lang="da-DK" sz="1800" dirty="0"/>
+              <a:t> to </a:t>
+            </a:r>
+            <a:r>
+              <a:rPr lang="da-DK" sz="1800" dirty="0" err="1"/>
+              <a:t>choose</a:t>
+            </a:r>
+            <a:r>
+              <a:rPr lang="da-DK" sz="1800" dirty="0"/>
+              <a:t> a </a:t>
+            </a:r>
+            <a:r>
+              <a:rPr lang="da-DK" sz="1800" dirty="0" err="1"/>
+              <a:t>specific</a:t>
+            </a:r>
+            <a:r>
+              <a:rPr lang="da-DK" sz="1800" dirty="0"/>
+              <a:t> party and  a </a:t>
+            </a:r>
+            <a:r>
+              <a:rPr lang="da-DK" sz="1800" dirty="0" err="1"/>
+              <a:t>specific</a:t>
+            </a:r>
+            <a:r>
+              <a:rPr lang="da-DK" sz="1800" dirty="0"/>
+              <a:t> time </a:t>
+            </a:r>
+            <a:r>
+              <a:rPr lang="da-DK" sz="1800" dirty="0" err="1"/>
+              <a:t>period</a:t>
+            </a:r>
+            <a:r>
+              <a:rPr lang="da-DK" sz="1800" dirty="0"/>
+              <a:t> and </a:t>
+            </a:r>
+            <a:r>
+              <a:rPr lang="da-DK" sz="1800" dirty="0" err="1"/>
+              <a:t>then</a:t>
+            </a:r>
+            <a:r>
+              <a:rPr lang="da-DK" sz="1800" dirty="0"/>
+              <a:t> </a:t>
+            </a:r>
+            <a:r>
+              <a:rPr lang="da-DK" sz="1800" dirty="0" err="1"/>
+              <a:t>get</a:t>
+            </a:r>
+            <a:r>
+              <a:rPr lang="da-DK" sz="1800" dirty="0"/>
+              <a:t> a list of all the </a:t>
+            </a:r>
+            <a:r>
+              <a:rPr lang="da-DK" sz="1800" dirty="0" err="1"/>
+              <a:t>laws</a:t>
+            </a:r>
+            <a:r>
+              <a:rPr lang="da-DK" sz="1800" dirty="0"/>
+              <a:t> </a:t>
+            </a:r>
+            <a:r>
+              <a:rPr lang="da-DK" sz="1800" dirty="0" err="1"/>
+              <a:t>they</a:t>
+            </a:r>
+            <a:r>
+              <a:rPr lang="da-DK" sz="1800" dirty="0"/>
+              <a:t> have </a:t>
+            </a:r>
+            <a:r>
+              <a:rPr lang="da-DK" sz="1800" dirty="0" err="1"/>
               <a:t>voted</a:t>
             </a:r>
             <a:r>
-              <a:rPr lang="da-DK" dirty="0"/>
-              <a:t> in the </a:t>
-            </a:r>
-            <a:r>
-              <a:rPr lang="da-DK" dirty="0" err="1"/>
-              <a:t>past</a:t>
-            </a:r>
-            <a:r>
-              <a:rPr lang="da-DK" dirty="0"/>
-              <a:t>. </a:t>
-            </a:r>
-          </a:p>
-          <a:p>
-            <a:r>
-              <a:rPr lang="da-DK" dirty="0"/>
+              <a:rPr lang="da-DK" sz="1800" dirty="0"/>
+              <a:t> for and </a:t>
+            </a:r>
+            <a:r>
+              <a:rPr lang="da-DK" sz="1800" dirty="0" err="1"/>
+              <a:t>against</a:t>
+            </a:r>
+            <a:r>
+              <a:rPr lang="da-DK" sz="1800" dirty="0"/>
+              <a:t>.</a:t>
+            </a:r>
+          </a:p>
+          <a:p>
+            <a:r>
+              <a:rPr lang="da-DK" sz="1800" dirty="0"/>
               <a:t>Data on </a:t>
             </a:r>
             <a:r>
-              <a:rPr lang="da-DK" dirty="0" err="1"/>
+              <a:rPr lang="da-DK" sz="1800" dirty="0" err="1"/>
               <a:t>this</a:t>
             </a:r>
             <a:r>
-              <a:rPr lang="da-DK" dirty="0"/>
+              <a:rPr lang="da-DK" sz="1800" dirty="0"/>
               <a:t> is </a:t>
             </a:r>
             <a:r>
-              <a:rPr lang="da-DK" dirty="0" err="1"/>
+              <a:rPr lang="da-DK" sz="1800" dirty="0" err="1"/>
               <a:t>publicly</a:t>
             </a:r>
             <a:r>
-              <a:rPr lang="da-DK" dirty="0"/>
+              <a:rPr lang="da-DK" sz="1800" dirty="0"/>
               <a:t> </a:t>
             </a:r>
             <a:r>
-              <a:rPr lang="da-DK" dirty="0" err="1"/>
+              <a:rPr lang="da-DK" sz="1800" dirty="0" err="1"/>
               <a:t>available</a:t>
             </a:r>
             <a:r>
-              <a:rPr lang="da-DK" dirty="0"/>
+              <a:rPr lang="da-DK" sz="1800" dirty="0"/>
               <a:t> on </a:t>
             </a:r>
             <a:r>
-              <a:rPr lang="da-DK" dirty="0">
+              <a:rPr lang="da-DK" sz="1800" dirty="0">
                 <a:hlinkClick r:id="rId2"/>
               </a:rPr>
               <a:t>https://oda.ft.dk/</a:t>
             </a:r>
             <a:r>
-              <a:rPr lang="da-DK" dirty="0"/>
+              <a:rPr lang="da-DK" sz="1800" dirty="0"/>
               <a:t> but it is not </a:t>
             </a:r>
             <a:r>
-              <a:rPr lang="da-DK" dirty="0" err="1"/>
+              <a:rPr lang="da-DK" sz="1800" dirty="0" err="1"/>
               <a:t>easy</a:t>
             </a:r>
             <a:r>
-              <a:rPr lang="da-DK" dirty="0"/>
+              <a:rPr lang="da-DK" sz="1800" dirty="0"/>
               <a:t> to </a:t>
             </a:r>
             <a:r>
-              <a:rPr lang="da-DK" dirty="0" err="1"/>
+              <a:rPr lang="da-DK" sz="1800" dirty="0" err="1"/>
               <a:t>get</a:t>
             </a:r>
             <a:r>
-              <a:rPr lang="da-DK" dirty="0"/>
+              <a:rPr lang="da-DK" sz="1800" dirty="0"/>
               <a:t> an overview on </a:t>
             </a:r>
             <a:r>
-              <a:rPr lang="da-DK" dirty="0" err="1"/>
+              <a:rPr lang="da-DK" sz="1800" dirty="0" err="1"/>
               <a:t>how</a:t>
             </a:r>
             <a:r>
-              <a:rPr lang="da-DK" dirty="0"/>
+              <a:rPr lang="da-DK" sz="1800" dirty="0"/>
               <a:t> a given party has </a:t>
             </a:r>
             <a:r>
-              <a:rPr lang="da-DK" dirty="0" err="1"/>
+              <a:rPr lang="da-DK" sz="1800" dirty="0" err="1"/>
               <a:t>voted</a:t>
             </a:r>
             <a:r>
-              <a:rPr lang="da-DK" dirty="0"/>
+              <a:rPr lang="da-DK" sz="1800" dirty="0"/>
               <a:t>.</a:t>
             </a:r>
           </a:p>
           <a:p>
             <a:r>
-              <a:rPr lang="da-DK" dirty="0"/>
-              <a:t>In </a:t>
-            </a:r>
-            <a:r>
-              <a:rPr lang="da-DK" dirty="0" err="1"/>
-              <a:t>our</a:t>
-            </a:r>
-            <a:r>
-              <a:rPr lang="da-DK" dirty="0"/>
+              <a:rPr lang="da-DK" sz="1800" dirty="0"/>
+              <a:t>The data </a:t>
+            </a:r>
+            <a:r>
+              <a:rPr lang="da-DK" sz="1800" dirty="0" err="1"/>
+              <a:t>exists</a:t>
+            </a:r>
+            <a:r>
+              <a:rPr lang="da-DK" sz="1800" dirty="0"/>
+              <a:t> in the oda.ft.dk database in the same </a:t>
+            </a:r>
+            <a:r>
+              <a:rPr lang="da-DK" sz="1800" dirty="0" err="1"/>
+              <a:t>structure</a:t>
+            </a:r>
+            <a:r>
+              <a:rPr lang="da-DK" sz="1800" dirty="0"/>
+              <a:t> as </a:t>
+            </a:r>
+            <a:r>
+              <a:rPr lang="da-DK" sz="1800" dirty="0" err="1"/>
+              <a:t>indicated</a:t>
+            </a:r>
+            <a:r>
+              <a:rPr lang="da-DK" sz="1800" dirty="0"/>
+              <a:t> in the E/R diagram, </a:t>
+            </a:r>
+            <a:r>
+              <a:rPr lang="da-DK" sz="1800" dirty="0" err="1"/>
+              <a:t>except</a:t>
+            </a:r>
+            <a:r>
+              <a:rPr lang="da-DK" sz="1800" dirty="0"/>
+              <a:t> the </a:t>
+            </a:r>
+            <a:r>
+              <a:rPr lang="da-DK" sz="1800" dirty="0" err="1"/>
+              <a:t>weak</a:t>
+            </a:r>
+            <a:r>
+              <a:rPr lang="da-DK" sz="1800" dirty="0"/>
               <a:t> </a:t>
             </a:r>
             <a:r>
-              <a:rPr lang="da-DK" dirty="0" err="1"/>
-              <a:t>webapplication</a:t>
-            </a:r>
-            <a:r>
-              <a:rPr lang="da-DK" dirty="0"/>
-              <a:t> it </a:t>
-            </a:r>
-            <a:r>
-              <a:rPr lang="da-DK" dirty="0" err="1"/>
-              <a:t>will</a:t>
-            </a:r>
-            <a:r>
-              <a:rPr lang="da-DK" dirty="0"/>
+              <a:rPr lang="da-DK" sz="1800" dirty="0" err="1"/>
+              <a:t>entity</a:t>
+            </a:r>
+            <a:r>
+              <a:rPr lang="da-DK" sz="1800" dirty="0"/>
+              <a:t> ”</a:t>
+            </a:r>
+            <a:r>
+              <a:rPr lang="da-DK" sz="1800" dirty="0" err="1"/>
+              <a:t>Party_Votes</a:t>
+            </a:r>
+            <a:r>
+              <a:rPr lang="da-DK" sz="1800" dirty="0"/>
+              <a:t>” </a:t>
+            </a:r>
+            <a:r>
+              <a:rPr lang="da-DK" sz="1800" dirty="0" err="1"/>
+              <a:t>which</a:t>
+            </a:r>
+            <a:r>
+              <a:rPr lang="da-DK" sz="1800" dirty="0"/>
+              <a:t> is </a:t>
+            </a:r>
+            <a:r>
+              <a:rPr lang="da-DK" sz="1800" dirty="0" err="1"/>
+              <a:t>created</a:t>
+            </a:r>
+            <a:r>
+              <a:rPr lang="da-DK" sz="1800" dirty="0"/>
+              <a:t> from data </a:t>
+            </a:r>
+            <a:r>
+              <a:rPr lang="da-DK" sz="1800" dirty="0" err="1"/>
+              <a:t>parsed</a:t>
+            </a:r>
+            <a:r>
+              <a:rPr lang="da-DK" sz="1800" dirty="0"/>
+              <a:t> from a </a:t>
+            </a:r>
+            <a:r>
+              <a:rPr lang="da-DK" sz="1800" dirty="0" err="1"/>
+              <a:t>text</a:t>
+            </a:r>
+            <a:r>
+              <a:rPr lang="da-DK" sz="1800" dirty="0"/>
               <a:t> </a:t>
             </a:r>
             <a:r>
-              <a:rPr lang="da-DK" dirty="0" err="1"/>
-              <a:t>be</a:t>
-            </a:r>
-            <a:r>
-              <a:rPr lang="da-DK" dirty="0"/>
+              <a:rPr lang="da-DK" sz="1800" dirty="0" err="1"/>
+              <a:t>field</a:t>
+            </a:r>
+            <a:r>
+              <a:rPr lang="da-DK" sz="1800" dirty="0"/>
+              <a:t> in the ”</a:t>
+            </a:r>
+            <a:r>
+              <a:rPr lang="da-DK" sz="1800" dirty="0" err="1"/>
+              <a:t>Vote</a:t>
+            </a:r>
+            <a:r>
+              <a:rPr lang="da-DK" sz="1800" dirty="0"/>
+              <a:t>” </a:t>
+            </a:r>
+            <a:r>
+              <a:rPr lang="da-DK" sz="1800" dirty="0" err="1"/>
+              <a:t>entity</a:t>
+            </a:r>
+            <a:r>
+              <a:rPr lang="da-DK" sz="1800" dirty="0"/>
+              <a:t>.</a:t>
+            </a:r>
+          </a:p>
+          <a:p>
+            <a:endParaRPr lang="da-DK" sz="1800" dirty="0"/>
+          </a:p>
+        </p:txBody>
+      </p:sp>
+      <p:sp>
+        <p:nvSpPr>
+          <p:cNvPr id="4" name="TextBox 3">
+            <a:extLst>
+              <a:ext uri="{FF2B5EF4-FFF2-40B4-BE49-F238E27FC236}">
+                <a16:creationId xmlns:a16="http://schemas.microsoft.com/office/drawing/2014/main" id="{BC286FA5-DA82-77FC-B876-8CCB805CBB65}"/>
+              </a:ext>
+            </a:extLst>
+          </p:cNvPr>
+          <p:cNvSpPr txBox="1"/>
+          <p:nvPr/>
+        </p:nvSpPr>
+        <p:spPr>
+          <a:xfrm>
+            <a:off x="668682" y="445973"/>
+            <a:ext cx="6309612" cy="830997"/>
+          </a:xfrm>
+          <a:prstGeom prst="rect">
+            <a:avLst/>
+          </a:prstGeom>
+          <a:noFill/>
+        </p:spPr>
+        <p:txBody>
+          <a:bodyPr wrap="none" rtlCol="0">
+            <a:spAutoFit/>
+          </a:bodyPr>
+          <a:lstStyle/>
+          <a:p>
+            <a:r>
+              <a:rPr lang="en-US" sz="2400" b="1" dirty="0"/>
+              <a:t>Project idea presentation – Vote Tracker App</a:t>
+            </a:r>
+          </a:p>
+          <a:p>
+            <a:r>
+              <a:rPr lang="en-US" b="1" dirty="0"/>
+              <a:t>Draft May 1</a:t>
+            </a:r>
+            <a:r>
+              <a:rPr lang="en-US" b="1" baseline="30000" dirty="0"/>
+              <a:t>st</a:t>
+            </a:r>
+            <a:r>
+              <a:rPr lang="en-US" sz="2400" b="1" dirty="0"/>
               <a:t> </a:t>
             </a:r>
-            <a:r>
-              <a:rPr lang="da-DK" dirty="0" err="1"/>
-              <a:t>possible</a:t>
-            </a:r>
-            <a:r>
-              <a:rPr lang="da-DK" dirty="0"/>
-              <a:t> to </a:t>
-            </a:r>
-            <a:r>
-              <a:rPr lang="da-DK" dirty="0" err="1"/>
-              <a:t>choose</a:t>
-            </a:r>
-            <a:r>
-              <a:rPr lang="da-DK" dirty="0"/>
-              <a:t> a </a:t>
-            </a:r>
-            <a:r>
-              <a:rPr lang="da-DK" dirty="0" err="1"/>
-              <a:t>specific</a:t>
-            </a:r>
-            <a:r>
-              <a:rPr lang="da-DK" dirty="0"/>
-              <a:t> party and  a </a:t>
-            </a:r>
-            <a:r>
-              <a:rPr lang="da-DK" dirty="0" err="1"/>
-              <a:t>specific</a:t>
-            </a:r>
-            <a:r>
-              <a:rPr lang="da-DK" dirty="0"/>
-              <a:t> time </a:t>
-            </a:r>
-            <a:r>
-              <a:rPr lang="da-DK" dirty="0" err="1"/>
-              <a:t>period</a:t>
-            </a:r>
-            <a:r>
-              <a:rPr lang="da-DK" dirty="0"/>
-              <a:t> and </a:t>
-            </a:r>
-            <a:r>
-              <a:rPr lang="da-DK" dirty="0" err="1"/>
-              <a:t>then</a:t>
-            </a:r>
-            <a:r>
-              <a:rPr lang="da-DK" dirty="0"/>
-              <a:t> </a:t>
-            </a:r>
-            <a:r>
-              <a:rPr lang="da-DK" dirty="0" err="1"/>
-              <a:t>get</a:t>
-            </a:r>
-            <a:r>
-              <a:rPr lang="da-DK" dirty="0"/>
-              <a:t> a list of all the </a:t>
-            </a:r>
-            <a:r>
-              <a:rPr lang="da-DK" dirty="0" err="1"/>
-              <a:t>laws</a:t>
-            </a:r>
-            <a:r>
-              <a:rPr lang="da-DK" dirty="0"/>
-              <a:t> </a:t>
-            </a:r>
-            <a:r>
-              <a:rPr lang="da-DK" dirty="0" err="1"/>
-              <a:t>they</a:t>
-            </a:r>
-            <a:r>
-              <a:rPr lang="da-DK" dirty="0"/>
-              <a:t> have </a:t>
-            </a:r>
-            <a:r>
-              <a:rPr lang="da-DK" dirty="0" err="1"/>
-              <a:t>voted</a:t>
-            </a:r>
-            <a:r>
-              <a:rPr lang="da-DK" dirty="0"/>
-              <a:t> for and </a:t>
-            </a:r>
-            <a:r>
-              <a:rPr lang="da-DK" dirty="0" err="1"/>
-              <a:t>against</a:t>
-            </a:r>
-            <a:r>
-              <a:rPr lang="da-DK"/>
-              <a:t>.</a:t>
-            </a:r>
-          </a:p>
-          <a:p>
-            <a:endParaRPr lang="da-DK"/>
+            <a:endParaRPr lang="en-DK" sz="2400" b="1" dirty="0"/>
           </a:p>
         </p:txBody>
       </p:sp>

</xml_diff>

<commit_message>
Added data file afsteminger
</commit_message>
<xml_diff>
--- a/Project_Idea (2).pptx
+++ b/Project_Idea (2).pptx
@@ -126,12 +126,12 @@
   <pc:docChgLst>
     <pc:chgData name="Kristian Bitsch Ebbensgaard" userId="db474494-81e8-4465-9809-a1d335558f45" providerId="ADAL" clId="{FFA8188F-B942-4A08-96FC-3BE27C79695F}"/>
     <pc:docChg chg="undo custSel modSld">
-      <pc:chgData name="Kristian Bitsch Ebbensgaard" userId="db474494-81e8-4465-9809-a1d335558f45" providerId="ADAL" clId="{FFA8188F-B942-4A08-96FC-3BE27C79695F}" dt="2025-04-30T20:06:46.082" v="393" actId="20577"/>
+      <pc:chgData name="Kristian Bitsch Ebbensgaard" userId="db474494-81e8-4465-9809-a1d335558f45" providerId="ADAL" clId="{FFA8188F-B942-4A08-96FC-3BE27C79695F}" dt="2025-05-01T11:07:20.076" v="394" actId="20577"/>
       <pc:docMkLst>
         <pc:docMk/>
       </pc:docMkLst>
       <pc:sldChg chg="addSp delSp modSp mod">
-        <pc:chgData name="Kristian Bitsch Ebbensgaard" userId="db474494-81e8-4465-9809-a1d335558f45" providerId="ADAL" clId="{FFA8188F-B942-4A08-96FC-3BE27C79695F}" dt="2025-04-30T20:06:46.082" v="393" actId="20577"/>
+        <pc:chgData name="Kristian Bitsch Ebbensgaard" userId="db474494-81e8-4465-9809-a1d335558f45" providerId="ADAL" clId="{FFA8188F-B942-4A08-96FC-3BE27C79695F}" dt="2025-05-01T11:07:20.076" v="394" actId="20577"/>
         <pc:sldMkLst>
           <pc:docMk/>
           <pc:sldMk cId="931196468" sldId="258"/>
@@ -145,7 +145,7 @@
           </ac:spMkLst>
         </pc:spChg>
         <pc:spChg chg="mod">
-          <ac:chgData name="Kristian Bitsch Ebbensgaard" userId="db474494-81e8-4465-9809-a1d335558f45" providerId="ADAL" clId="{FFA8188F-B942-4A08-96FC-3BE27C79695F}" dt="2025-04-30T20:06:46.082" v="393" actId="20577"/>
+          <ac:chgData name="Kristian Bitsch Ebbensgaard" userId="db474494-81e8-4465-9809-a1d335558f45" providerId="ADAL" clId="{FFA8188F-B942-4A08-96FC-3BE27C79695F}" dt="2025-05-01T11:07:20.076" v="394" actId="20577"/>
           <ac:spMkLst>
             <pc:docMk/>
             <pc:sldMk cId="931196468" sldId="258"/>
@@ -315,7 +315,7 @@
           <a:p>
             <a:fld id="{F309DC6E-A2C7-499C-AE0C-185FA2954680}" type="datetimeFigureOut">
               <a:rPr lang="en-DK" smtClean="0"/>
-              <a:t>30/04/2025</a:t>
+              <a:t>01/05/2025</a:t>
             </a:fld>
             <a:endParaRPr lang="en-DK"/>
           </a:p>
@@ -515,7 +515,7 @@
           <a:p>
             <a:fld id="{F309DC6E-A2C7-499C-AE0C-185FA2954680}" type="datetimeFigureOut">
               <a:rPr lang="en-DK" smtClean="0"/>
-              <a:t>30/04/2025</a:t>
+              <a:t>01/05/2025</a:t>
             </a:fld>
             <a:endParaRPr lang="en-DK"/>
           </a:p>
@@ -725,7 +725,7 @@
           <a:p>
             <a:fld id="{F309DC6E-A2C7-499C-AE0C-185FA2954680}" type="datetimeFigureOut">
               <a:rPr lang="en-DK" smtClean="0"/>
-              <a:t>30/04/2025</a:t>
+              <a:t>01/05/2025</a:t>
             </a:fld>
             <a:endParaRPr lang="en-DK"/>
           </a:p>
@@ -925,7 +925,7 @@
           <a:p>
             <a:fld id="{F309DC6E-A2C7-499C-AE0C-185FA2954680}" type="datetimeFigureOut">
               <a:rPr lang="en-DK" smtClean="0"/>
-              <a:t>30/04/2025</a:t>
+              <a:t>01/05/2025</a:t>
             </a:fld>
             <a:endParaRPr lang="en-DK"/>
           </a:p>
@@ -1201,7 +1201,7 @@
           <a:p>
             <a:fld id="{F309DC6E-A2C7-499C-AE0C-185FA2954680}" type="datetimeFigureOut">
               <a:rPr lang="en-DK" smtClean="0"/>
-              <a:t>30/04/2025</a:t>
+              <a:t>01/05/2025</a:t>
             </a:fld>
             <a:endParaRPr lang="en-DK"/>
           </a:p>
@@ -1469,7 +1469,7 @@
           <a:p>
             <a:fld id="{F309DC6E-A2C7-499C-AE0C-185FA2954680}" type="datetimeFigureOut">
               <a:rPr lang="en-DK" smtClean="0"/>
-              <a:t>30/04/2025</a:t>
+              <a:t>01/05/2025</a:t>
             </a:fld>
             <a:endParaRPr lang="en-DK"/>
           </a:p>
@@ -1884,7 +1884,7 @@
           <a:p>
             <a:fld id="{F309DC6E-A2C7-499C-AE0C-185FA2954680}" type="datetimeFigureOut">
               <a:rPr lang="en-DK" smtClean="0"/>
-              <a:t>30/04/2025</a:t>
+              <a:t>01/05/2025</a:t>
             </a:fld>
             <a:endParaRPr lang="en-DK"/>
           </a:p>
@@ -2026,7 +2026,7 @@
           <a:p>
             <a:fld id="{F309DC6E-A2C7-499C-AE0C-185FA2954680}" type="datetimeFigureOut">
               <a:rPr lang="en-DK" smtClean="0"/>
-              <a:t>30/04/2025</a:t>
+              <a:t>01/05/2025</a:t>
             </a:fld>
             <a:endParaRPr lang="en-DK"/>
           </a:p>
@@ -2139,7 +2139,7 @@
           <a:p>
             <a:fld id="{F309DC6E-A2C7-499C-AE0C-185FA2954680}" type="datetimeFigureOut">
               <a:rPr lang="en-DK" smtClean="0"/>
-              <a:t>30/04/2025</a:t>
+              <a:t>01/05/2025</a:t>
             </a:fld>
             <a:endParaRPr lang="en-DK"/>
           </a:p>
@@ -2452,7 +2452,7 @@
           <a:p>
             <a:fld id="{F309DC6E-A2C7-499C-AE0C-185FA2954680}" type="datetimeFigureOut">
               <a:rPr lang="en-DK" smtClean="0"/>
-              <a:t>30/04/2025</a:t>
+              <a:t>01/05/2025</a:t>
             </a:fld>
             <a:endParaRPr lang="en-DK"/>
           </a:p>
@@ -2741,7 +2741,7 @@
           <a:p>
             <a:fld id="{F309DC6E-A2C7-499C-AE0C-185FA2954680}" type="datetimeFigureOut">
               <a:rPr lang="en-DK" smtClean="0"/>
-              <a:t>30/04/2025</a:t>
+              <a:t>01/05/2025</a:t>
             </a:fld>
             <a:endParaRPr lang="en-DK"/>
           </a:p>
@@ -2984,7 +2984,7 @@
           <a:p>
             <a:fld id="{F309DC6E-A2C7-499C-AE0C-185FA2954680}" type="datetimeFigureOut">
               <a:rPr lang="en-DK" smtClean="0"/>
-              <a:t>30/04/2025</a:t>
+              <a:t>01/05/2025</a:t>
             </a:fld>
             <a:endParaRPr lang="en-DK"/>
           </a:p>
@@ -3826,13 +3826,10 @@
               <a:t>” </a:t>
             </a:r>
             <a:r>
-              <a:rPr lang="da-DK" sz="1800" dirty="0" err="1"/>
+              <a:rPr lang="da-DK" sz="1800"/>
               <a:t>entity</a:t>
             </a:r>
-            <a:r>
-              <a:rPr lang="da-DK" sz="1800" dirty="0"/>
-              <a:t>.</a:t>
-            </a:r>
+            <a:endParaRPr lang="da-DK" sz="1800" dirty="0"/>
           </a:p>
           <a:p>
             <a:endParaRPr lang="da-DK" sz="1800" dirty="0"/>

</xml_diff>